<commit_message>
atualização ppt 1 main ou master
</commit_message>
<xml_diff>
--- a/01 Classes/Aula 01 Programação Python - Caracterização e Ambiente.pptx
+++ b/01 Classes/Aula 01 Programação Python - Caracterização e Ambiente.pptx
@@ -5918,6 +5918,16 @@
               <a:t> </a:t>
             </a:r>
             <a:r>
+              <a:rPr lang="pt-BR" sz="2000" b="1" dirty="0" err="1">
+                <a:solidFill>
+                  <a:srgbClr val="0070C0"/>
+                </a:solidFill>
+                <a:latin typeface="Times New Roman" panose="02020603050405020304" pitchFamily="18" charset="0"/>
+                <a:cs typeface="Times New Roman" panose="02020603050405020304" pitchFamily="18" charset="0"/>
+              </a:rPr>
+              <a:t>main</a:t>
+            </a:r>
+            <a:r>
               <a:rPr lang="pt-BR" sz="2000" b="1" dirty="0">
                 <a:solidFill>
                   <a:srgbClr val="FF0000"/>
@@ -5925,7 +5935,7 @@
                 <a:latin typeface="Times New Roman" panose="02020603050405020304" pitchFamily="18" charset="0"/>
                 <a:cs typeface="Times New Roman" panose="02020603050405020304" pitchFamily="18" charset="0"/>
               </a:rPr>
-              <a:t>master</a:t>
+              <a:t> ou master</a:t>
             </a:r>
           </a:p>
           <a:p>
@@ -5962,6 +5972,16 @@
               <a:t>: </a:t>
             </a:r>
             <a:r>
+              <a:rPr lang="pt-BR" sz="2000" b="1" dirty="0" err="1">
+                <a:solidFill>
+                  <a:srgbClr val="0070C0"/>
+                </a:solidFill>
+                <a:latin typeface="Times New Roman" panose="02020603050405020304" pitchFamily="18" charset="0"/>
+                <a:cs typeface="Times New Roman" panose="02020603050405020304" pitchFamily="18" charset="0"/>
+              </a:rPr>
+              <a:t>main</a:t>
+            </a:r>
+            <a:r>
               <a:rPr lang="pt-BR" sz="2000" b="1" dirty="0">
                 <a:solidFill>
                   <a:srgbClr val="0070C0"/>
@@ -5969,17 +5989,17 @@
                 <a:latin typeface="Times New Roman" panose="02020603050405020304" pitchFamily="18" charset="0"/>
                 <a:cs typeface="Times New Roman" panose="02020603050405020304" pitchFamily="18" charset="0"/>
               </a:rPr>
-              <a:t>master ou </a:t>
-            </a:r>
-            <a:r>
-              <a:rPr lang="pt-BR" sz="2000" b="1" dirty="0" err="1">
+              <a:t> </a:t>
+            </a:r>
+            <a:r>
+              <a:rPr lang="pt-BR" sz="2000" b="1">
                 <a:solidFill>
                   <a:srgbClr val="0070C0"/>
                 </a:solidFill>
                 <a:latin typeface="Times New Roman" panose="02020603050405020304" pitchFamily="18" charset="0"/>
                 <a:cs typeface="Times New Roman" panose="02020603050405020304" pitchFamily="18" charset="0"/>
               </a:rPr>
-              <a:t>main</a:t>
+              <a:t>ou master</a:t>
             </a:r>
             <a:r>
               <a:rPr lang="pt-BR" sz="2000" b="1" dirty="0">
@@ -6556,7 +6576,7 @@
                 <a:latin typeface="Times New Roman" panose="02020603050405020304" pitchFamily="18" charset="0"/>
                 <a:cs typeface="Times New Roman" panose="02020603050405020304" pitchFamily="18" charset="0"/>
               </a:rPr>
-              <a:t> --global usern.name “</a:t>
+              <a:t> --global user.name “</a:t>
             </a:r>
             <a:r>
               <a:rPr lang="pt-BR" b="1" dirty="0">
@@ -6633,7 +6653,7 @@
                 <a:latin typeface="Times New Roman" panose="02020603050405020304" pitchFamily="18" charset="0"/>
                 <a:cs typeface="Times New Roman" panose="02020603050405020304" pitchFamily="18" charset="0"/>
               </a:rPr>
-              <a:t>usern.email</a:t>
+              <a:t>user.email</a:t>
             </a:r>
             <a:r>
               <a:rPr lang="pt-BR" b="1" dirty="0">
@@ -7376,7 +7396,27 @@
                 <a:latin typeface="Times New Roman" panose="02020603050405020304" pitchFamily="18" charset="0"/>
                 <a:cs typeface="Times New Roman" panose="02020603050405020304" pitchFamily="18" charset="0"/>
               </a:rPr>
-              <a:t> master</a:t>
+              <a:t> </a:t>
+            </a:r>
+            <a:r>
+              <a:rPr lang="pt-BR" sz="2000" b="1" dirty="0" err="1">
+                <a:solidFill>
+                  <a:srgbClr val="0070C0"/>
+                </a:solidFill>
+                <a:latin typeface="Times New Roman" panose="02020603050405020304" pitchFamily="18" charset="0"/>
+                <a:cs typeface="Times New Roman" panose="02020603050405020304" pitchFamily="18" charset="0"/>
+              </a:rPr>
+              <a:t>main</a:t>
+            </a:r>
+            <a:r>
+              <a:rPr lang="pt-BR" sz="2000" b="1" dirty="0">
+                <a:solidFill>
+                  <a:srgbClr val="FF0000"/>
+                </a:solidFill>
+                <a:latin typeface="Times New Roman" panose="02020603050405020304" pitchFamily="18" charset="0"/>
+                <a:cs typeface="Times New Roman" panose="02020603050405020304" pitchFamily="18" charset="0"/>
+              </a:rPr>
+              <a:t> ou master</a:t>
             </a:r>
             <a:r>
               <a:rPr lang="pt-BR" sz="2000" dirty="0">
@@ -7448,17 +7488,7 @@
                 <a:latin typeface="Times New Roman" panose="02020603050405020304" pitchFamily="18" charset="0"/>
                 <a:cs typeface="Times New Roman" panose="02020603050405020304" pitchFamily="18" charset="0"/>
               </a:rPr>
-              <a:t> (Pesquisar tema SSH) </a:t>
-            </a:r>
-            <a:r>
-              <a:rPr lang="pt-BR" sz="2000" b="1">
-                <a:solidFill>
-                  <a:srgbClr val="FF0000"/>
-                </a:solidFill>
-                <a:latin typeface="Times New Roman" panose="02020603050405020304" pitchFamily="18" charset="0"/>
-                <a:cs typeface="Times New Roman" panose="02020603050405020304" pitchFamily="18" charset="0"/>
-              </a:rPr>
-              <a:t>- Token</a:t>
+              <a:t> (Pesquisar tema SSH) - Token</a:t>
             </a:r>
             <a:endParaRPr lang="pt-BR" sz="2000" dirty="0">
               <a:latin typeface="Times New Roman" panose="02020603050405020304" pitchFamily="18" charset="0"/>

</xml_diff>